<commit_message>
separated model view controller files
</commit_message>
<xml_diff>
--- a/Image2ppt/Input/test.pptx
+++ b/Image2ppt/Input/test.pptx
@@ -3138,7 +3138,7 @@
         <p:spPr>
           <a:xfrm>
             <a:off x="-38" y="0"/>
-            <a:ext cx="4064000" cy="4064000"/>
+            <a:ext cx="3048000" cy="3048000"/>
           </a:xfrm>
           <a:prstGeom prst="rect">
             <a:avLst/>
@@ -3162,7 +3162,7 @@
         <p:spPr>
           <a:xfrm>
             <a:off x="3047885" y="0"/>
-            <a:ext cx="4064000" cy="4064000"/>
+            <a:ext cx="3048000" cy="3048000"/>
           </a:xfrm>
           <a:prstGeom prst="rect">
             <a:avLst/>
@@ -3186,7 +3186,7 @@
         <p:spPr>
           <a:xfrm>
             <a:off x="6095809" y="0"/>
-            <a:ext cx="4064000" cy="4064000"/>
+            <a:ext cx="3048000" cy="3048000"/>
           </a:xfrm>
           <a:prstGeom prst="rect">
             <a:avLst/>
@@ -3210,7 +3210,7 @@
         <p:spPr>
           <a:xfrm>
             <a:off x="9143733" y="0"/>
-            <a:ext cx="4064000" cy="4064000"/>
+            <a:ext cx="3048000" cy="3048000"/>
           </a:xfrm>
           <a:prstGeom prst="rect">
             <a:avLst/>
@@ -3234,7 +3234,7 @@
         <p:spPr>
           <a:xfrm>
             <a:off x="-38" y="3809999"/>
-            <a:ext cx="4064000" cy="4064000"/>
+            <a:ext cx="3048000" cy="3048000"/>
           </a:xfrm>
           <a:prstGeom prst="rect">
             <a:avLst/>
@@ -3258,7 +3258,7 @@
         <p:spPr>
           <a:xfrm>
             <a:off x="3047885" y="3809999"/>
-            <a:ext cx="4064000" cy="4064000"/>
+            <a:ext cx="3048000" cy="3048000"/>
           </a:xfrm>
           <a:prstGeom prst="rect">
             <a:avLst/>
@@ -3282,7 +3282,7 @@
         <p:spPr>
           <a:xfrm>
             <a:off x="6095809" y="3809999"/>
-            <a:ext cx="4064000" cy="4064000"/>
+            <a:ext cx="3048000" cy="3048000"/>
           </a:xfrm>
           <a:prstGeom prst="rect">
             <a:avLst/>
@@ -3305,8 +3305,8 @@
         </p:blipFill>
         <p:spPr>
           <a:xfrm>
-            <a:off x="9348520" y="2286000"/>
-            <a:ext cx="3517900" cy="6096000"/>
+            <a:off x="9683482" y="3429000"/>
+            <a:ext cx="1968500" cy="3429000"/>
           </a:xfrm>
           <a:prstGeom prst="rect">
             <a:avLst/>
@@ -3379,8 +3379,8 @@
         </p:blipFill>
         <p:spPr>
           <a:xfrm>
-            <a:off x="-38" y="0"/>
-            <a:ext cx="4064000" cy="5410200"/>
+            <a:off x="241261" y="0"/>
+            <a:ext cx="2565400" cy="3429000"/>
           </a:xfrm>
           <a:prstGeom prst="rect">
             <a:avLst/>
@@ -3404,7 +3404,7 @@
         <p:spPr>
           <a:xfrm>
             <a:off x="3047885" y="0"/>
-            <a:ext cx="4064000" cy="3048000"/>
+            <a:ext cx="3048000" cy="2286000"/>
           </a:xfrm>
           <a:prstGeom prst="rect">
             <a:avLst/>
@@ -3427,8 +3427,8 @@
         </p:blipFill>
         <p:spPr>
           <a:xfrm>
-            <a:off x="6095809" y="0"/>
-            <a:ext cx="4064000" cy="5410200"/>
+            <a:off x="6337108" y="0"/>
+            <a:ext cx="2565400" cy="3429000"/>
           </a:xfrm>
           <a:prstGeom prst="rect">
             <a:avLst/>
@@ -3451,8 +3451,8 @@
         </p:blipFill>
         <p:spPr>
           <a:xfrm>
-            <a:off x="9143733" y="0"/>
-            <a:ext cx="4064000" cy="5410200"/>
+            <a:off x="9385032" y="0"/>
+            <a:ext cx="2565400" cy="3429000"/>
           </a:xfrm>
           <a:prstGeom prst="rect">
             <a:avLst/>
@@ -3476,7 +3476,7 @@
         <p:spPr>
           <a:xfrm>
             <a:off x="-38" y="4572000"/>
-            <a:ext cx="4064000" cy="3048000"/>
+            <a:ext cx="3048000" cy="2286000"/>
           </a:xfrm>
           <a:prstGeom prst="rect">
             <a:avLst/>
@@ -3500,7 +3500,7 @@
         <p:spPr>
           <a:xfrm>
             <a:off x="3047885" y="4572000"/>
-            <a:ext cx="4064000" cy="3048000"/>
+            <a:ext cx="3048000" cy="2286000"/>
           </a:xfrm>
           <a:prstGeom prst="rect">
             <a:avLst/>
@@ -3523,8 +3523,8 @@
         </p:blipFill>
         <p:spPr>
           <a:xfrm>
-            <a:off x="6095809" y="2800350"/>
-            <a:ext cx="4064000" cy="5410200"/>
+            <a:off x="6337108" y="3429000"/>
+            <a:ext cx="2565400" cy="3429000"/>
           </a:xfrm>
           <a:prstGeom prst="rect">
             <a:avLst/>
@@ -3548,7 +3548,7 @@
         <p:spPr>
           <a:xfrm>
             <a:off x="9143733" y="4572000"/>
-            <a:ext cx="4064000" cy="3048000"/>
+            <a:ext cx="3048000" cy="2286000"/>
           </a:xfrm>
           <a:prstGeom prst="rect">
             <a:avLst/>

</xml_diff>

<commit_message>
ppt size can be chosen
</commit_message>
<xml_diff>
--- a/Image2ppt/Input/test.pptx
+++ b/Image2ppt/Input/test.pptx
@@ -8,7 +8,7 @@
     <p:sldId id="256" r:id="rId7"/>
     <p:sldId id="257" r:id="rId8"/>
   </p:sldIdLst>
-  <p:sldSz cx="12191695" cy="6858000" type="screen4x3"/>
+  <p:sldSz cx="4572000" cy="6858000" type="screen4x3"/>
   <p:notesSz cx="6858000" cy="9144000"/>
   <p:defaultTextStyle>
     <a:defPPr>
@@ -3097,7 +3097,7 @@
         </p:nvSpPr>
         <p:spPr>
           <a:xfrm>
-            <a:off x="5501487" y="2880360"/>
+            <a:off x="1691640" y="2880360"/>
             <a:ext cx="914400" cy="914400"/>
           </a:xfrm>
           <a:prstGeom prst="rect">
@@ -3137,8 +3137,8 @@
         </p:blipFill>
         <p:spPr>
           <a:xfrm>
-            <a:off x="-38" y="0"/>
-            <a:ext cx="3048000" cy="3048000"/>
+            <a:off x="0" y="0"/>
+            <a:ext cx="1143000" cy="1143000"/>
           </a:xfrm>
           <a:prstGeom prst="rect">
             <a:avLst/>
@@ -3161,8 +3161,8 @@
         </p:blipFill>
         <p:spPr>
           <a:xfrm>
-            <a:off x="3047885" y="0"/>
-            <a:ext cx="3048000" cy="3048000"/>
+            <a:off x="1143000" y="0"/>
+            <a:ext cx="1143000" cy="1143000"/>
           </a:xfrm>
           <a:prstGeom prst="rect">
             <a:avLst/>
@@ -3185,8 +3185,8 @@
         </p:blipFill>
         <p:spPr>
           <a:xfrm>
-            <a:off x="6095809" y="0"/>
-            <a:ext cx="3048000" cy="3048000"/>
+            <a:off x="2286000" y="0"/>
+            <a:ext cx="1143000" cy="1143000"/>
           </a:xfrm>
           <a:prstGeom prst="rect">
             <a:avLst/>
@@ -3209,8 +3209,8 @@
         </p:blipFill>
         <p:spPr>
           <a:xfrm>
-            <a:off x="9143733" y="0"/>
-            <a:ext cx="3048000" cy="3048000"/>
+            <a:off x="3429000" y="0"/>
+            <a:ext cx="1143000" cy="1143000"/>
           </a:xfrm>
           <a:prstGeom prst="rect">
             <a:avLst/>
@@ -3233,8 +3233,8 @@
         </p:blipFill>
         <p:spPr>
           <a:xfrm>
-            <a:off x="-38" y="3809999"/>
-            <a:ext cx="3048000" cy="3048000"/>
+            <a:off x="0" y="5715000"/>
+            <a:ext cx="1143000" cy="1143000"/>
           </a:xfrm>
           <a:prstGeom prst="rect">
             <a:avLst/>
@@ -3257,8 +3257,8 @@
         </p:blipFill>
         <p:spPr>
           <a:xfrm>
-            <a:off x="3047885" y="3809999"/>
-            <a:ext cx="3048000" cy="3048000"/>
+            <a:off x="1143000" y="5715000"/>
+            <a:ext cx="1143000" cy="1143000"/>
           </a:xfrm>
           <a:prstGeom prst="rect">
             <a:avLst/>
@@ -3281,8 +3281,8 @@
         </p:blipFill>
         <p:spPr>
           <a:xfrm>
-            <a:off x="6095809" y="3809999"/>
-            <a:ext cx="3048000" cy="3048000"/>
+            <a:off x="2286000" y="5715000"/>
+            <a:ext cx="1143000" cy="1143000"/>
           </a:xfrm>
           <a:prstGeom prst="rect">
             <a:avLst/>
@@ -3305,8 +3305,8 @@
         </p:blipFill>
         <p:spPr>
           <a:xfrm>
-            <a:off x="9683482" y="3429000"/>
-            <a:ext cx="1968500" cy="3429000"/>
+            <a:off x="3429000" y="4889500"/>
+            <a:ext cx="1143000" cy="1968500"/>
           </a:xfrm>
           <a:prstGeom prst="rect">
             <a:avLst/>
@@ -3339,7 +3339,7 @@
         </p:nvSpPr>
         <p:spPr>
           <a:xfrm>
-            <a:off x="5501487" y="2880360"/>
+            <a:off x="1691640" y="2880360"/>
             <a:ext cx="914400" cy="914400"/>
           </a:xfrm>
           <a:prstGeom prst="rect">
@@ -3379,8 +3379,8 @@
         </p:blipFill>
         <p:spPr>
           <a:xfrm>
-            <a:off x="241261" y="0"/>
-            <a:ext cx="2565400" cy="3429000"/>
+            <a:off x="0" y="0"/>
+            <a:ext cx="1143000" cy="1524000"/>
           </a:xfrm>
           <a:prstGeom prst="rect">
             <a:avLst/>
@@ -3403,8 +3403,8 @@
         </p:blipFill>
         <p:spPr>
           <a:xfrm>
-            <a:off x="3047885" y="0"/>
-            <a:ext cx="3048000" cy="2286000"/>
+            <a:off x="1143000" y="0"/>
+            <a:ext cx="1143000" cy="850900"/>
           </a:xfrm>
           <a:prstGeom prst="rect">
             <a:avLst/>
@@ -3427,8 +3427,8 @@
         </p:blipFill>
         <p:spPr>
           <a:xfrm>
-            <a:off x="6337108" y="0"/>
-            <a:ext cx="2565400" cy="3429000"/>
+            <a:off x="2286000" y="0"/>
+            <a:ext cx="1143000" cy="1524000"/>
           </a:xfrm>
           <a:prstGeom prst="rect">
             <a:avLst/>
@@ -3451,8 +3451,8 @@
         </p:blipFill>
         <p:spPr>
           <a:xfrm>
-            <a:off x="9385032" y="0"/>
-            <a:ext cx="2565400" cy="3429000"/>
+            <a:off x="3429000" y="0"/>
+            <a:ext cx="1143000" cy="1524000"/>
           </a:xfrm>
           <a:prstGeom prst="rect">
             <a:avLst/>
@@ -3475,8 +3475,8 @@
         </p:blipFill>
         <p:spPr>
           <a:xfrm>
-            <a:off x="-38" y="4572000"/>
-            <a:ext cx="3048000" cy="2286000"/>
+            <a:off x="0" y="6007100"/>
+            <a:ext cx="1143000" cy="850900"/>
           </a:xfrm>
           <a:prstGeom prst="rect">
             <a:avLst/>
@@ -3499,8 +3499,8 @@
         </p:blipFill>
         <p:spPr>
           <a:xfrm>
-            <a:off x="3047885" y="4572000"/>
-            <a:ext cx="3048000" cy="2286000"/>
+            <a:off x="1143000" y="6007100"/>
+            <a:ext cx="1143000" cy="850900"/>
           </a:xfrm>
           <a:prstGeom prst="rect">
             <a:avLst/>
@@ -3523,8 +3523,8 @@
         </p:blipFill>
         <p:spPr>
           <a:xfrm>
-            <a:off x="6337108" y="3429000"/>
-            <a:ext cx="2565400" cy="3429000"/>
+            <a:off x="2286000" y="5334000"/>
+            <a:ext cx="1143000" cy="1524000"/>
           </a:xfrm>
           <a:prstGeom prst="rect">
             <a:avLst/>
@@ -3547,8 +3547,8 @@
         </p:blipFill>
         <p:spPr>
           <a:xfrm>
-            <a:off x="9143733" y="4572000"/>
-            <a:ext cx="3048000" cy="2286000"/>
+            <a:off x="3429000" y="6007100"/>
+            <a:ext cx="1143000" cy="850900"/>
           </a:xfrm>
           <a:prstGeom prst="rect">
             <a:avLst/>
@@ -3563,7 +3563,7 @@
         </p:nvSpPr>
         <p:spPr>
           <a:xfrm>
-            <a:off x="4267047" y="2971800"/>
+            <a:off x="457200" y="2971800"/>
             <a:ext cx="3657600" cy="914400"/>
           </a:xfrm>
           <a:prstGeom prst="roundRect">

</xml_diff>

<commit_message>
cleaned up some comments
</commit_message>
<xml_diff>
--- a/Image2ppt/Input/test.pptx
+++ b/Image2ppt/Input/test.pptx
@@ -8,7 +8,7 @@
     <p:sldId id="256" r:id="rId7"/>
     <p:sldId id="257" r:id="rId8"/>
   </p:sldIdLst>
-  <p:sldSz cx="4572000" cy="6858000" type="screen4x3"/>
+  <p:sldSz cx="12191996" cy="6858000" type="screen4x3"/>
   <p:notesSz cx="6858000" cy="9144000"/>
   <p:defaultTextStyle>
     <a:defPPr>
@@ -3097,7 +3097,7 @@
         </p:nvSpPr>
         <p:spPr>
           <a:xfrm>
-            <a:off x="1691640" y="2880360"/>
+            <a:off x="5501638" y="2880360"/>
             <a:ext cx="914400" cy="914400"/>
           </a:xfrm>
           <a:prstGeom prst="rect">
@@ -3138,7 +3138,7 @@
         <p:spPr>
           <a:xfrm>
             <a:off x="0" y="0"/>
-            <a:ext cx="1143000" cy="1143000"/>
+            <a:ext cx="3035300" cy="3035300"/>
           </a:xfrm>
           <a:prstGeom prst="rect">
             <a:avLst/>
@@ -3161,8 +3161,8 @@
         </p:blipFill>
         <p:spPr>
           <a:xfrm>
-            <a:off x="1143000" y="0"/>
-            <a:ext cx="1143000" cy="1143000"/>
+            <a:off x="3047999" y="0"/>
+            <a:ext cx="3035300" cy="3035300"/>
           </a:xfrm>
           <a:prstGeom prst="rect">
             <a:avLst/>
@@ -3185,8 +3185,8 @@
         </p:blipFill>
         <p:spPr>
           <a:xfrm>
-            <a:off x="2286000" y="0"/>
-            <a:ext cx="1143000" cy="1143000"/>
+            <a:off x="6095998" y="0"/>
+            <a:ext cx="3035300" cy="3035300"/>
           </a:xfrm>
           <a:prstGeom prst="rect">
             <a:avLst/>
@@ -3209,8 +3209,8 @@
         </p:blipFill>
         <p:spPr>
           <a:xfrm>
-            <a:off x="3429000" y="0"/>
-            <a:ext cx="1143000" cy="1143000"/>
+            <a:off x="9143997" y="0"/>
+            <a:ext cx="3035300" cy="3035300"/>
           </a:xfrm>
           <a:prstGeom prst="rect">
             <a:avLst/>
@@ -3233,8 +3233,8 @@
         </p:blipFill>
         <p:spPr>
           <a:xfrm>
-            <a:off x="0" y="5715000"/>
-            <a:ext cx="1143000" cy="1143000"/>
+            <a:off x="0" y="3822700"/>
+            <a:ext cx="3035300" cy="3035300"/>
           </a:xfrm>
           <a:prstGeom prst="rect">
             <a:avLst/>
@@ -3257,8 +3257,8 @@
         </p:blipFill>
         <p:spPr>
           <a:xfrm>
-            <a:off x="1143000" y="5715000"/>
-            <a:ext cx="1143000" cy="1143000"/>
+            <a:off x="3047999" y="3822700"/>
+            <a:ext cx="3035300" cy="3035300"/>
           </a:xfrm>
           <a:prstGeom prst="rect">
             <a:avLst/>
@@ -3281,8 +3281,8 @@
         </p:blipFill>
         <p:spPr>
           <a:xfrm>
-            <a:off x="2286000" y="5715000"/>
-            <a:ext cx="1143000" cy="1143000"/>
+            <a:off x="6095998" y="3822700"/>
+            <a:ext cx="3035300" cy="3035300"/>
           </a:xfrm>
           <a:prstGeom prst="rect">
             <a:avLst/>
@@ -3305,8 +3305,8 @@
         </p:blipFill>
         <p:spPr>
           <a:xfrm>
-            <a:off x="3429000" y="4889500"/>
-            <a:ext cx="1143000" cy="1968500"/>
+            <a:off x="9677397" y="3429000"/>
+            <a:ext cx="1968500" cy="3429000"/>
           </a:xfrm>
           <a:prstGeom prst="rect">
             <a:avLst/>
@@ -3339,7 +3339,7 @@
         </p:nvSpPr>
         <p:spPr>
           <a:xfrm>
-            <a:off x="1691640" y="2880360"/>
+            <a:off x="5501638" y="2880360"/>
             <a:ext cx="914400" cy="914400"/>
           </a:xfrm>
           <a:prstGeom prst="rect">
@@ -3379,8 +3379,8 @@
         </p:blipFill>
         <p:spPr>
           <a:xfrm>
-            <a:off x="0" y="0"/>
-            <a:ext cx="1143000" cy="1524000"/>
+            <a:off x="234950" y="0"/>
+            <a:ext cx="2565400" cy="3429000"/>
           </a:xfrm>
           <a:prstGeom prst="rect">
             <a:avLst/>
@@ -3403,8 +3403,8 @@
         </p:blipFill>
         <p:spPr>
           <a:xfrm>
-            <a:off x="1143000" y="0"/>
-            <a:ext cx="1143000" cy="850900"/>
+            <a:off x="3047999" y="0"/>
+            <a:ext cx="3035300" cy="2273300"/>
           </a:xfrm>
           <a:prstGeom prst="rect">
             <a:avLst/>
@@ -3427,8 +3427,8 @@
         </p:blipFill>
         <p:spPr>
           <a:xfrm>
-            <a:off x="2286000" y="0"/>
-            <a:ext cx="1143000" cy="1524000"/>
+            <a:off x="6330948" y="0"/>
+            <a:ext cx="2565400" cy="3429000"/>
           </a:xfrm>
           <a:prstGeom prst="rect">
             <a:avLst/>
@@ -3451,8 +3451,8 @@
         </p:blipFill>
         <p:spPr>
           <a:xfrm>
-            <a:off x="3429000" y="0"/>
-            <a:ext cx="1143000" cy="1524000"/>
+            <a:off x="9378947" y="0"/>
+            <a:ext cx="2565400" cy="3429000"/>
           </a:xfrm>
           <a:prstGeom prst="rect">
             <a:avLst/>
@@ -3475,8 +3475,8 @@
         </p:blipFill>
         <p:spPr>
           <a:xfrm>
-            <a:off x="0" y="6007100"/>
-            <a:ext cx="1143000" cy="850900"/>
+            <a:off x="0" y="4584700"/>
+            <a:ext cx="3035300" cy="2273300"/>
           </a:xfrm>
           <a:prstGeom prst="rect">
             <a:avLst/>
@@ -3499,8 +3499,8 @@
         </p:blipFill>
         <p:spPr>
           <a:xfrm>
-            <a:off x="1143000" y="6007100"/>
-            <a:ext cx="1143000" cy="850900"/>
+            <a:off x="3047999" y="4584700"/>
+            <a:ext cx="3035300" cy="2273300"/>
           </a:xfrm>
           <a:prstGeom prst="rect">
             <a:avLst/>
@@ -3523,8 +3523,8 @@
         </p:blipFill>
         <p:spPr>
           <a:xfrm>
-            <a:off x="2286000" y="5334000"/>
-            <a:ext cx="1143000" cy="1524000"/>
+            <a:off x="6330948" y="3429000"/>
+            <a:ext cx="2565400" cy="3429000"/>
           </a:xfrm>
           <a:prstGeom prst="rect">
             <a:avLst/>
@@ -3547,8 +3547,8 @@
         </p:blipFill>
         <p:spPr>
           <a:xfrm>
-            <a:off x="3429000" y="6007100"/>
-            <a:ext cx="1143000" cy="850900"/>
+            <a:off x="9143997" y="4584700"/>
+            <a:ext cx="3035300" cy="2273300"/>
           </a:xfrm>
           <a:prstGeom prst="rect">
             <a:avLst/>
@@ -3563,7 +3563,7 @@
         </p:nvSpPr>
         <p:spPr>
           <a:xfrm>
-            <a:off x="457200" y="2971800"/>
+            <a:off x="4267198" y="2971800"/>
             <a:ext cx="3657600" cy="914400"/>
           </a:xfrm>
           <a:prstGeom prst="roundRect">

</xml_diff>

<commit_message>
sorting old/new new/old added
</commit_message>
<xml_diff>
--- a/Image2ppt/Input/test.pptx
+++ b/Image2ppt/Input/test.pptx
@@ -3154,15 +3154,15 @@
           <p:nvPr/>
         </p:nvPicPr>
         <p:blipFill>
-          <a:blip r:embed="rId2"/>
+          <a:blip r:embed="rId3"/>
           <a:stretch>
             <a:fillRect/>
           </a:stretch>
         </p:blipFill>
         <p:spPr>
           <a:xfrm>
-            <a:off x="6095984" y="0"/>
-            <a:ext cx="6083300" cy="6083300"/>
+            <a:off x="7162784" y="0"/>
+            <a:ext cx="3949700" cy="6858000"/>
           </a:xfrm>
           <a:prstGeom prst="rect">
             <a:avLst/>
@@ -3298,15 +3298,15 @@
           <p:nvPr/>
         </p:nvPicPr>
         <p:blipFill>
-          <a:blip r:embed="rId3"/>
+          <a:blip r:embed="rId2"/>
           <a:stretch>
             <a:fillRect/>
           </a:stretch>
         </p:blipFill>
         <p:spPr>
           <a:xfrm>
-            <a:off x="19354754" y="6858000"/>
-            <a:ext cx="3949700" cy="6858000"/>
+            <a:off x="18287954" y="7632700"/>
+            <a:ext cx="6083300" cy="6083300"/>
           </a:xfrm>
           <a:prstGeom prst="rect">
             <a:avLst/>
@@ -3379,8 +3379,8 @@
         </p:blipFill>
         <p:spPr>
           <a:xfrm>
-            <a:off x="469900" y="0"/>
-            <a:ext cx="5143500" cy="6858000"/>
+            <a:off x="0" y="0"/>
+            <a:ext cx="6083300" cy="4559300"/>
           </a:xfrm>
           <a:prstGeom prst="rect">
             <a:avLst/>
@@ -3403,8 +3403,8 @@
         </p:blipFill>
         <p:spPr>
           <a:xfrm>
-            <a:off x="6095984" y="0"/>
-            <a:ext cx="6083300" cy="4559300"/>
+            <a:off x="6565884" y="0"/>
+            <a:ext cx="5143500" cy="6858000"/>
           </a:xfrm>
           <a:prstGeom prst="rect">
             <a:avLst/>
@@ -3427,8 +3427,8 @@
         </p:blipFill>
         <p:spPr>
           <a:xfrm>
-            <a:off x="12661869" y="0"/>
-            <a:ext cx="5143500" cy="6858000"/>
+            <a:off x="12191969" y="0"/>
+            <a:ext cx="6083300" cy="4559300"/>
           </a:xfrm>
           <a:prstGeom prst="rect">
             <a:avLst/>
@@ -3451,8 +3451,8 @@
         </p:blipFill>
         <p:spPr>
           <a:xfrm>
-            <a:off x="18757854" y="0"/>
-            <a:ext cx="5143500" cy="6858000"/>
+            <a:off x="18287954" y="0"/>
+            <a:ext cx="6083300" cy="4559300"/>
           </a:xfrm>
           <a:prstGeom prst="rect">
             <a:avLst/>
@@ -3475,8 +3475,8 @@
         </p:blipFill>
         <p:spPr>
           <a:xfrm>
-            <a:off x="0" y="9156700"/>
-            <a:ext cx="6083300" cy="4559300"/>
+            <a:off x="469900" y="6858000"/>
+            <a:ext cx="5143500" cy="6858000"/>
           </a:xfrm>
           <a:prstGeom prst="rect">
             <a:avLst/>
@@ -3499,8 +3499,8 @@
         </p:blipFill>
         <p:spPr>
           <a:xfrm>
-            <a:off x="6095984" y="9156700"/>
-            <a:ext cx="6083300" cy="4559300"/>
+            <a:off x="6565884" y="6858000"/>
+            <a:ext cx="5143500" cy="6858000"/>
           </a:xfrm>
           <a:prstGeom prst="rect">
             <a:avLst/>
@@ -3523,8 +3523,8 @@
         </p:blipFill>
         <p:spPr>
           <a:xfrm>
-            <a:off x="12661869" y="6858000"/>
-            <a:ext cx="5143500" cy="6858000"/>
+            <a:off x="12191969" y="9156700"/>
+            <a:ext cx="6083300" cy="4559300"/>
           </a:xfrm>
           <a:prstGeom prst="rect">
             <a:avLst/>
@@ -3547,8 +3547,8 @@
         </p:blipFill>
         <p:spPr>
           <a:xfrm>
-            <a:off x="18287954" y="9156700"/>
-            <a:ext cx="6083300" cy="4559300"/>
+            <a:off x="18757854" y="6858000"/>
+            <a:ext cx="5143500" cy="6858000"/>
           </a:xfrm>
           <a:prstGeom prst="rect">
             <a:avLst/>

</xml_diff>

<commit_message>
added textbox visible flag
</commit_message>
<xml_diff>
--- a/Image2ppt/Input/test.pptx
+++ b/Image2ppt/Input/test.pptx
@@ -3089,41 +3089,9 @@
         <p:nvPr/>
       </p:nvGrpSpPr>
       <p:grpSpPr/>
-      <p:sp>
-        <p:nvSpPr>
-          <p:cNvPr id="2" name="TextBox 1"/>
-          <p:cNvSpPr txBox="1"/>
-          <p:nvPr/>
-        </p:nvSpPr>
-        <p:spPr>
-          <a:xfrm>
-            <a:off x="11597609" y="6309360"/>
-            <a:ext cx="914400" cy="914400"/>
-          </a:xfrm>
-          <a:prstGeom prst="rect">
-            <a:avLst/>
-          </a:prstGeom>
-          <a:noFill/>
-        </p:spPr>
-        <p:txBody>
-          <a:bodyPr wrap="none">
-            <a:spAutoFit/>
-          </a:bodyPr>
-          <a:lstStyle/>
-          <a:p/>
-          <a:p>
-            <a:pPr>
-              <a:defRPr sz="3000"/>
-            </a:pPr>
-            <a:r>
-              <a:t>Cell 1</a:t>
-            </a:r>
-          </a:p>
-        </p:txBody>
-      </p:sp>
       <p:pic>
         <p:nvPicPr>
-          <p:cNvPr id="3" name="Picture 2" descr="image.gif"/>
+          <p:cNvPr id="2" name="Picture 1" descr="image.gif"/>
           <p:cNvPicPr>
             <a:picLocks noChangeAspect="1"/>
           </p:cNvPicPr>
@@ -3147,7 +3115,7 @@
       </p:pic>
       <p:pic>
         <p:nvPicPr>
-          <p:cNvPr id="4" name="Picture 3" descr="image.gif"/>
+          <p:cNvPr id="3" name="Picture 2" descr="image.gif"/>
           <p:cNvPicPr>
             <a:picLocks noChangeAspect="1"/>
           </p:cNvPicPr>
@@ -3171,7 +3139,7 @@
       </p:pic>
       <p:pic>
         <p:nvPicPr>
-          <p:cNvPr id="5" name="Picture 4" descr="image.gif"/>
+          <p:cNvPr id="4" name="Picture 3" descr="image.gif"/>
           <p:cNvPicPr>
             <a:picLocks noChangeAspect="1"/>
           </p:cNvPicPr>
@@ -3195,7 +3163,7 @@
       </p:pic>
       <p:pic>
         <p:nvPicPr>
-          <p:cNvPr id="6" name="Picture 5" descr="image.gif"/>
+          <p:cNvPr id="5" name="Picture 4" descr="image.gif"/>
           <p:cNvPicPr>
             <a:picLocks noChangeAspect="1"/>
           </p:cNvPicPr>
@@ -3219,7 +3187,7 @@
       </p:pic>
       <p:pic>
         <p:nvPicPr>
-          <p:cNvPr id="7" name="Picture 6" descr="image.gif"/>
+          <p:cNvPr id="6" name="Picture 5" descr="image.gif"/>
           <p:cNvPicPr>
             <a:picLocks noChangeAspect="1"/>
           </p:cNvPicPr>
@@ -3243,7 +3211,7 @@
       </p:pic>
       <p:pic>
         <p:nvPicPr>
-          <p:cNvPr id="8" name="Picture 7" descr="image.gif"/>
+          <p:cNvPr id="7" name="Picture 6" descr="image.gif"/>
           <p:cNvPicPr>
             <a:picLocks noChangeAspect="1"/>
           </p:cNvPicPr>
@@ -3267,7 +3235,7 @@
       </p:pic>
       <p:pic>
         <p:nvPicPr>
-          <p:cNvPr id="9" name="Picture 8" descr="image.gif"/>
+          <p:cNvPr id="8" name="Picture 7" descr="image.gif"/>
           <p:cNvPicPr>
             <a:picLocks noChangeAspect="1"/>
           </p:cNvPicPr>
@@ -3291,7 +3259,7 @@
       </p:pic>
       <p:pic>
         <p:nvPicPr>
-          <p:cNvPr id="10" name="Picture 9" descr="image.gif"/>
+          <p:cNvPr id="9" name="Picture 8" descr="image.gif"/>
           <p:cNvPicPr>
             <a:picLocks noChangeAspect="1"/>
           </p:cNvPicPr>
@@ -3331,41 +3299,9 @@
         <p:nvPr/>
       </p:nvGrpSpPr>
       <p:grpSpPr/>
-      <p:sp>
-        <p:nvSpPr>
-          <p:cNvPr id="2" name="TextBox 1"/>
-          <p:cNvSpPr txBox="1"/>
-          <p:nvPr/>
-        </p:nvSpPr>
-        <p:spPr>
-          <a:xfrm>
-            <a:off x="11597609" y="6309360"/>
-            <a:ext cx="914400" cy="914400"/>
-          </a:xfrm>
-          <a:prstGeom prst="rect">
-            <a:avLst/>
-          </a:prstGeom>
-          <a:noFill/>
-        </p:spPr>
-        <p:txBody>
-          <a:bodyPr wrap="none">
-            <a:spAutoFit/>
-          </a:bodyPr>
-          <a:lstStyle/>
-          <a:p/>
-          <a:p>
-            <a:pPr>
-              <a:defRPr sz="3000"/>
-            </a:pPr>
-            <a:r>
-              <a:t>Cell 1</a:t>
-            </a:r>
-          </a:p>
-        </p:txBody>
-      </p:sp>
       <p:pic>
         <p:nvPicPr>
-          <p:cNvPr id="3" name="Picture 2" descr="image.gif"/>
+          <p:cNvPr id="2" name="Picture 1" descr="image.gif"/>
           <p:cNvPicPr>
             <a:picLocks noChangeAspect="1"/>
           </p:cNvPicPr>
@@ -3389,7 +3325,7 @@
       </p:pic>
       <p:pic>
         <p:nvPicPr>
-          <p:cNvPr id="4" name="Picture 3" descr="image.gif"/>
+          <p:cNvPr id="3" name="Picture 2" descr="image.gif"/>
           <p:cNvPicPr>
             <a:picLocks noChangeAspect="1"/>
           </p:cNvPicPr>
@@ -3405,6 +3341,30 @@
           <a:xfrm>
             <a:off x="6565884" y="0"/>
             <a:ext cx="5143500" cy="6858000"/>
+          </a:xfrm>
+          <a:prstGeom prst="rect">
+            <a:avLst/>
+          </a:prstGeom>
+        </p:spPr>
+      </p:pic>
+      <p:pic>
+        <p:nvPicPr>
+          <p:cNvPr id="4" name="Picture 3" descr="image.gif"/>
+          <p:cNvPicPr>
+            <a:picLocks noChangeAspect="1"/>
+          </p:cNvPicPr>
+          <p:nvPr/>
+        </p:nvPicPr>
+        <p:blipFill>
+          <a:blip r:embed="rId4"/>
+          <a:stretch>
+            <a:fillRect/>
+          </a:stretch>
+        </p:blipFill>
+        <p:spPr>
+          <a:xfrm>
+            <a:off x="12191969" y="0"/>
+            <a:ext cx="6083300" cy="6083300"/>
           </a:xfrm>
           <a:prstGeom prst="rect">
             <a:avLst/>
@@ -3427,7 +3387,7 @@
         </p:blipFill>
         <p:spPr>
           <a:xfrm>
-            <a:off x="12191969" y="0"/>
+            <a:off x="18287954" y="0"/>
             <a:ext cx="6083300" cy="6083300"/>
           </a:xfrm>
           <a:prstGeom prst="rect">
@@ -3451,7 +3411,7 @@
         </p:blipFill>
         <p:spPr>
           <a:xfrm>
-            <a:off x="18287954" y="0"/>
+            <a:off x="0" y="7632700"/>
             <a:ext cx="6083300" cy="6083300"/>
           </a:xfrm>
           <a:prstGeom prst="rect">
@@ -3475,7 +3435,7 @@
         </p:blipFill>
         <p:spPr>
           <a:xfrm>
-            <a:off x="0" y="7632700"/>
+            <a:off x="6095984" y="7632700"/>
             <a:ext cx="6083300" cy="6083300"/>
           </a:xfrm>
           <a:prstGeom prst="rect">
@@ -3499,7 +3459,7 @@
         </p:blipFill>
         <p:spPr>
           <a:xfrm>
-            <a:off x="6095984" y="7632700"/>
+            <a:off x="12191969" y="7632700"/>
             <a:ext cx="6083300" cy="6083300"/>
           </a:xfrm>
           <a:prstGeom prst="rect">
@@ -3523,7 +3483,7 @@
         </p:blipFill>
         <p:spPr>
           <a:xfrm>
-            <a:off x="12191969" y="7632700"/>
+            <a:off x="18287954" y="7632700"/>
             <a:ext cx="6083300" cy="6083300"/>
           </a:xfrm>
           <a:prstGeom prst="rect">
@@ -3531,33 +3491,9 @@
           </a:prstGeom>
         </p:spPr>
       </p:pic>
-      <p:pic>
-        <p:nvPicPr>
-          <p:cNvPr id="10" name="Picture 9" descr="image.gif"/>
-          <p:cNvPicPr>
-            <a:picLocks noChangeAspect="1"/>
-          </p:cNvPicPr>
-          <p:nvPr/>
-        </p:nvPicPr>
-        <p:blipFill>
-          <a:blip r:embed="rId4"/>
-          <a:stretch>
-            <a:fillRect/>
-          </a:stretch>
-        </p:blipFill>
-        <p:spPr>
-          <a:xfrm>
-            <a:off x="18287954" y="7632700"/>
-            <a:ext cx="6083300" cy="6083300"/>
-          </a:xfrm>
-          <a:prstGeom prst="rect">
-            <a:avLst/>
-          </a:prstGeom>
-        </p:spPr>
-      </p:pic>
-      <p:sp>
-        <p:nvSpPr>
-          <p:cNvPr id="11" name="Rounded Rectangle 10"/>
+      <p:sp>
+        <p:nvSpPr>
+          <p:cNvPr id="10" name="Rounded Rectangle 9"/>
           <p:cNvSpPr/>
           <p:nvPr/>
         </p:nvSpPr>

</xml_diff>

<commit_message>
cell number splitting test
</commit_message>
<xml_diff>
--- a/Image2ppt/Input/test.pptx
+++ b/Image2ppt/Input/test.pptx
@@ -3089,41 +3089,9 @@
         <p:nvPr/>
       </p:nvGrpSpPr>
       <p:grpSpPr/>
-      <p:sp>
-        <p:nvSpPr>
-          <p:cNvPr id="2" name="TextBox 1"/>
-          <p:cNvSpPr txBox="1"/>
-          <p:nvPr/>
-        </p:nvSpPr>
-        <p:spPr>
-          <a:xfrm>
-            <a:off x="11597609" y="6309360"/>
-            <a:ext cx="914400" cy="914400"/>
-          </a:xfrm>
-          <a:prstGeom prst="rect">
-            <a:avLst/>
-          </a:prstGeom>
-          <a:noFill/>
-        </p:spPr>
-        <p:txBody>
-          <a:bodyPr wrap="none">
-            <a:spAutoFit/>
-          </a:bodyPr>
-          <a:lstStyle/>
-          <a:p/>
-          <a:p>
-            <a:pPr>
-              <a:defRPr sz="3000"/>
-            </a:pPr>
-            <a:r>
-              <a:t>Cell 1</a:t>
-            </a:r>
-          </a:p>
-        </p:txBody>
-      </p:sp>
       <p:pic>
         <p:nvPicPr>
-          <p:cNvPr id="3" name="Picture 2" descr="image.gif"/>
+          <p:cNvPr id="2" name="Picture 1" descr="image.gif"/>
           <p:cNvPicPr>
             <a:picLocks noChangeAspect="1"/>
           </p:cNvPicPr>
@@ -3147,7 +3115,7 @@
       </p:pic>
       <p:pic>
         <p:nvPicPr>
-          <p:cNvPr id="4" name="Picture 3" descr="image.gif"/>
+          <p:cNvPr id="3" name="Picture 2" descr="image.gif"/>
           <p:cNvPicPr>
             <a:picLocks noChangeAspect="1"/>
           </p:cNvPicPr>
@@ -3171,7 +3139,7 @@
       </p:pic>
       <p:pic>
         <p:nvPicPr>
-          <p:cNvPr id="5" name="Picture 4" descr="image.gif"/>
+          <p:cNvPr id="4" name="Picture 3" descr="image.gif"/>
           <p:cNvPicPr>
             <a:picLocks noChangeAspect="1"/>
           </p:cNvPicPr>
@@ -3195,7 +3163,7 @@
       </p:pic>
       <p:pic>
         <p:nvPicPr>
-          <p:cNvPr id="6" name="Picture 5" descr="image.gif"/>
+          <p:cNvPr id="5" name="Picture 4" descr="image.gif"/>
           <p:cNvPicPr>
             <a:picLocks noChangeAspect="1"/>
           </p:cNvPicPr>
@@ -3219,7 +3187,7 @@
       </p:pic>
       <p:pic>
         <p:nvPicPr>
-          <p:cNvPr id="7" name="Picture 6" descr="image.gif"/>
+          <p:cNvPr id="6" name="Picture 5" descr="image.gif"/>
           <p:cNvPicPr>
             <a:picLocks noChangeAspect="1"/>
           </p:cNvPicPr>
@@ -3243,7 +3211,7 @@
       </p:pic>
       <p:pic>
         <p:nvPicPr>
-          <p:cNvPr id="8" name="Picture 7" descr="image.gif"/>
+          <p:cNvPr id="7" name="Picture 6" descr="image.gif"/>
           <p:cNvPicPr>
             <a:picLocks noChangeAspect="1"/>
           </p:cNvPicPr>
@@ -3265,54 +3233,51 @@
           </a:prstGeom>
         </p:spPr>
       </p:pic>
-      <p:pic>
-        <p:nvPicPr>
-          <p:cNvPr id="9" name="Picture 8" descr="image.gif"/>
-          <p:cNvPicPr>
-            <a:picLocks noChangeAspect="1"/>
-          </p:cNvPicPr>
+      <p:sp>
+        <p:nvSpPr>
+          <p:cNvPr id="8" name="Rounded Rectangle 7"/>
+          <p:cNvSpPr/>
           <p:nvPr/>
-        </p:nvPicPr>
-        <p:blipFill>
-          <a:blip r:embed="rId3"/>
-          <a:stretch>
-            <a:fillRect/>
-          </a:stretch>
-        </p:blipFill>
+        </p:nvSpPr>
         <p:spPr>
           <a:xfrm>
-            <a:off x="12191969" y="7632700"/>
-            <a:ext cx="6083300" cy="6083300"/>
+            <a:off x="10363169" y="6400800"/>
+            <a:ext cx="3657600" cy="914400"/>
           </a:xfrm>
-          <a:prstGeom prst="rect">
+          <a:prstGeom prst="roundRect">
             <a:avLst/>
           </a:prstGeom>
+          <a:solidFill>
+            <a:srgbClr val="FA6464"/>
+          </a:solidFill>
         </p:spPr>
-      </p:pic>
-      <p:pic>
-        <p:nvPicPr>
-          <p:cNvPr id="10" name="Picture 9" descr="image.gif"/>
-          <p:cNvPicPr>
-            <a:picLocks noChangeAspect="1"/>
-          </p:cNvPicPr>
-          <p:nvPr/>
-        </p:nvPicPr>
-        <p:blipFill>
-          <a:blip r:embed="rId3"/>
-          <a:stretch>
-            <a:fillRect/>
-          </a:stretch>
-        </p:blipFill>
-        <p:spPr>
-          <a:xfrm>
-            <a:off x="18287954" y="7632700"/>
-            <a:ext cx="6083300" cy="6083300"/>
-          </a:xfrm>
-          <a:prstGeom prst="rect">
-            <a:avLst/>
-          </a:prstGeom>
-        </p:spPr>
-      </p:pic>
+        <p:style>
+          <a:lnRef idx="1">
+            <a:schemeClr val="accent1"/>
+          </a:lnRef>
+          <a:fillRef idx="3">
+            <a:schemeClr val="accent1"/>
+          </a:fillRef>
+          <a:effectRef idx="2">
+            <a:schemeClr val="accent1"/>
+          </a:effectRef>
+          <a:fontRef idx="minor">
+            <a:schemeClr val="lt1"/>
+          </a:fontRef>
+        </p:style>
+        <p:txBody>
+          <a:bodyPr rtlCol="0" anchor="ctr"/>
+          <a:lstStyle/>
+          <a:p>
+            <a:pPr algn="ctr">
+              <a:defRPr sz="1000"/>
+            </a:pPr>
+            <a:r>
+              <a:t>ROUNDED_RECTANGLE</a:t>
+            </a:r>
+          </a:p>
+        </p:txBody>
+      </p:sp>
     </p:spTree>
   </p:cSld>
   <p:clrMapOvr>
@@ -3331,38 +3296,30 @@
         <p:nvPr/>
       </p:nvGrpSpPr>
       <p:grpSpPr/>
-      <p:sp>
-        <p:nvSpPr>
-          <p:cNvPr id="2" name="TextBox 1"/>
-          <p:cNvSpPr txBox="1"/>
+      <p:pic>
+        <p:nvPicPr>
+          <p:cNvPr id="2" name="Picture 1" descr="image.gif"/>
+          <p:cNvPicPr>
+            <a:picLocks noChangeAspect="1"/>
+          </p:cNvPicPr>
           <p:nvPr/>
-        </p:nvSpPr>
+        </p:nvPicPr>
+        <p:blipFill>
+          <a:blip r:embed="rId2"/>
+          <a:stretch>
+            <a:fillRect/>
+          </a:stretch>
+        </p:blipFill>
         <p:spPr>
           <a:xfrm>
-            <a:off x="11597609" y="6309360"/>
-            <a:ext cx="914400" cy="914400"/>
+            <a:off x="0" y="0"/>
+            <a:ext cx="6083300" cy="6083300"/>
           </a:xfrm>
           <a:prstGeom prst="rect">
             <a:avLst/>
           </a:prstGeom>
-          <a:noFill/>
         </p:spPr>
-        <p:txBody>
-          <a:bodyPr wrap="none">
-            <a:spAutoFit/>
-          </a:bodyPr>
-          <a:lstStyle/>
-          <a:p/>
-          <a:p>
-            <a:pPr>
-              <a:defRPr sz="3000"/>
-            </a:pPr>
-            <a:r>
-              <a:t>Cell 1</a:t>
-            </a:r>
-          </a:p>
-        </p:txBody>
-      </p:sp>
+      </p:pic>
       <p:pic>
         <p:nvPicPr>
           <p:cNvPr id="3" name="Picture 2" descr="image.gif"/>
@@ -3379,8 +3336,8 @@
         </p:blipFill>
         <p:spPr>
           <a:xfrm>
-            <a:off x="0" y="0"/>
-            <a:ext cx="6083300" cy="4559300"/>
+            <a:off x="6095984" y="0"/>
+            <a:ext cx="6083300" cy="6083300"/>
           </a:xfrm>
           <a:prstGeom prst="rect">
             <a:avLst/>
@@ -3403,8 +3360,8 @@
         </p:blipFill>
         <p:spPr>
           <a:xfrm>
-            <a:off x="6565884" y="0"/>
-            <a:ext cx="5143500" cy="6858000"/>
+            <a:off x="12191969" y="0"/>
+            <a:ext cx="6083300" cy="4559300"/>
           </a:xfrm>
           <a:prstGeom prst="rect">
             <a:avLst/>
@@ -3427,8 +3384,8 @@
         </p:blipFill>
         <p:spPr>
           <a:xfrm>
-            <a:off x="12191969" y="0"/>
-            <a:ext cx="6083300" cy="4559300"/>
+            <a:off x="18757854" y="0"/>
+            <a:ext cx="5143500" cy="6858000"/>
           </a:xfrm>
           <a:prstGeom prst="rect">
             <a:avLst/>
@@ -3451,7 +3408,7 @@
         </p:blipFill>
         <p:spPr>
           <a:xfrm>
-            <a:off x="18287954" y="0"/>
+            <a:off x="0" y="9156700"/>
             <a:ext cx="6083300" cy="4559300"/>
           </a:xfrm>
           <a:prstGeom prst="rect">
@@ -3475,55 +3432,7 @@
         </p:blipFill>
         <p:spPr>
           <a:xfrm>
-            <a:off x="469900" y="6858000"/>
-            <a:ext cx="5143500" cy="6858000"/>
-          </a:xfrm>
-          <a:prstGeom prst="rect">
-            <a:avLst/>
-          </a:prstGeom>
-        </p:spPr>
-      </p:pic>
-      <p:pic>
-        <p:nvPicPr>
-          <p:cNvPr id="8" name="Picture 7" descr="image.gif"/>
-          <p:cNvPicPr>
-            <a:picLocks noChangeAspect="1"/>
-          </p:cNvPicPr>
-          <p:nvPr/>
-        </p:nvPicPr>
-        <p:blipFill>
-          <a:blip r:embed="rId7"/>
-          <a:stretch>
-            <a:fillRect/>
-          </a:stretch>
-        </p:blipFill>
-        <p:spPr>
-          <a:xfrm>
-            <a:off x="6565884" y="6858000"/>
-            <a:ext cx="5143500" cy="6858000"/>
-          </a:xfrm>
-          <a:prstGeom prst="rect">
-            <a:avLst/>
-          </a:prstGeom>
-        </p:spPr>
-      </p:pic>
-      <p:pic>
-        <p:nvPicPr>
-          <p:cNvPr id="9" name="Picture 8" descr="image.gif"/>
-          <p:cNvPicPr>
-            <a:picLocks noChangeAspect="1"/>
-          </p:cNvPicPr>
-          <p:nvPr/>
-        </p:nvPicPr>
-        <p:blipFill>
-          <a:blip r:embed="rId2"/>
-          <a:stretch>
-            <a:fillRect/>
-          </a:stretch>
-        </p:blipFill>
-        <p:spPr>
-          <a:xfrm>
-            <a:off x="12191969" y="9156700"/>
+            <a:off x="6095984" y="9156700"/>
             <a:ext cx="6083300" cy="4559300"/>
           </a:xfrm>
           <a:prstGeom prst="rect">
@@ -3531,33 +3440,9 @@
           </a:prstGeom>
         </p:spPr>
       </p:pic>
-      <p:pic>
-        <p:nvPicPr>
-          <p:cNvPr id="10" name="Picture 9" descr="image.gif"/>
-          <p:cNvPicPr>
-            <a:picLocks noChangeAspect="1"/>
-          </p:cNvPicPr>
-          <p:nvPr/>
-        </p:nvPicPr>
-        <p:blipFill>
-          <a:blip r:embed="rId3"/>
-          <a:stretch>
-            <a:fillRect/>
-          </a:stretch>
-        </p:blipFill>
-        <p:spPr>
-          <a:xfrm>
-            <a:off x="18757854" y="6858000"/>
-            <a:ext cx="5143500" cy="6858000"/>
-          </a:xfrm>
-          <a:prstGeom prst="rect">
-            <a:avLst/>
-          </a:prstGeom>
-        </p:spPr>
-      </p:pic>
-      <p:sp>
-        <p:nvSpPr>
-          <p:cNvPr id="11" name="Rounded Rectangle 10"/>
+      <p:sp>
+        <p:nvSpPr>
+          <p:cNvPr id="8" name="Rounded Rectangle 7"/>
           <p:cNvSpPr/>
           <p:nvPr/>
         </p:nvSpPr>

</xml_diff>